<commit_message>
Sprint id retrieved, slides placeholder indexes to constants
</commit_message>
<xml_diff>
--- a/template_demo.pptx
+++ b/template_demo.pptx
@@ -5,12 +5,13 @@
     <p:sldMasterId id="2147483648" r:id="rId1"/>
   </p:sldMasterIdLst>
   <p:notesMasterIdLst>
-    <p:notesMasterId r:id="rId5"/>
+    <p:notesMasterId r:id="rId6"/>
   </p:notesMasterIdLst>
   <p:sldIdLst>
     <p:sldId id="256" r:id="rId2"/>
     <p:sldId id="257" r:id="rId3"/>
     <p:sldId id="258" r:id="rId4"/>
+    <p:sldId id="298" r:id="rId5"/>
   </p:sldIdLst>
   <p:sldSz cx="9144000" cy="5143500" type="screen16x9"/>
   <p:notesSz cx="6858000" cy="9144000"/>
@@ -542,6 +543,110 @@
 </p:notes>
 </file>
 
+<file path=ppt/notesSlides/notesSlide2.xml><?xml version="1.0" encoding="utf-8"?>
+<p:notes xmlns:a="http://schemas.openxmlformats.org/drawingml/2006/main" xmlns:r="http://schemas.openxmlformats.org/officeDocument/2006/relationships" xmlns:p="http://schemas.openxmlformats.org/presentationml/2006/main" showMasterSp="0" showMasterPhAnim="0">
+  <p:cSld>
+    <p:spTree>
+      <p:nvGrpSpPr>
+        <p:cNvPr id="1" name="Shape 370"/>
+        <p:cNvGrpSpPr/>
+        <p:nvPr/>
+      </p:nvGrpSpPr>
+      <p:grpSpPr>
+        <a:xfrm>
+          <a:off x="0" y="0"/>
+          <a:ext cx="0" cy="0"/>
+          <a:chOff x="0" y="0"/>
+          <a:chExt cx="0" cy="0"/>
+        </a:xfrm>
+      </p:grpSpPr>
+      <p:sp>
+        <p:nvSpPr>
+          <p:cNvPr id="371" name="Google Shape;371;g1d376a8c0cd_0_0:notes"/>
+          <p:cNvSpPr>
+            <a:spLocks noGrp="1" noRot="1" noChangeAspect="1"/>
+          </p:cNvSpPr>
+          <p:nvPr>
+            <p:ph type="sldImg" idx="2"/>
+          </p:nvPr>
+        </p:nvSpPr>
+        <p:spPr>
+          <a:xfrm>
+            <a:off x="381000" y="685800"/>
+            <a:ext cx="6096000" cy="3429000"/>
+          </a:xfrm>
+          <a:custGeom>
+            <a:avLst/>
+            <a:gdLst/>
+            <a:ahLst/>
+            <a:cxnLst/>
+            <a:rect l="l" t="t" r="r" b="b"/>
+            <a:pathLst>
+              <a:path w="120000" h="120000" extrusionOk="0">
+                <a:moveTo>
+                  <a:pt x="0" y="0"/>
+                </a:moveTo>
+                <a:lnTo>
+                  <a:pt x="120000" y="0"/>
+                </a:lnTo>
+                <a:lnTo>
+                  <a:pt x="120000" y="120000"/>
+                </a:lnTo>
+                <a:lnTo>
+                  <a:pt x="0" y="120000"/>
+                </a:lnTo>
+                <a:close/>
+              </a:path>
+            </a:pathLst>
+          </a:custGeom>
+        </p:spPr>
+      </p:sp>
+      <p:sp>
+        <p:nvSpPr>
+          <p:cNvPr id="372" name="Google Shape;372;g1d376a8c0cd_0_0:notes"/>
+          <p:cNvSpPr txBox="1">
+            <a:spLocks noGrp="1"/>
+          </p:cNvSpPr>
+          <p:nvPr>
+            <p:ph type="body" idx="1"/>
+          </p:nvPr>
+        </p:nvSpPr>
+        <p:spPr>
+          <a:xfrm>
+            <a:off x="685800" y="4343400"/>
+            <a:ext cx="5486400" cy="4114800"/>
+          </a:xfrm>
+          <a:prstGeom prst="rect">
+            <a:avLst/>
+          </a:prstGeom>
+        </p:spPr>
+        <p:txBody>
+          <a:bodyPr spcFirstLastPara="1" wrap="square" lIns="91425" tIns="91425" rIns="91425" bIns="91425" anchor="t" anchorCtr="0">
+            <a:noAutofit/>
+          </a:bodyPr>
+          <a:lstStyle/>
+          <a:p>
+            <a:pPr marL="0" lvl="0" indent="0" algn="l" rtl="0">
+              <a:spcBef>
+                <a:spcPts val="0"/>
+              </a:spcBef>
+              <a:spcAft>
+                <a:spcPts val="0"/>
+              </a:spcAft>
+              <a:buNone/>
+            </a:pPr>
+            <a:endParaRPr/>
+          </a:p>
+        </p:txBody>
+      </p:sp>
+    </p:spTree>
+  </p:cSld>
+  <p:clrMapOvr>
+    <a:masterClrMapping/>
+  </p:clrMapOvr>
+</p:notes>
+</file>
+
 <file path=ppt/slideLayouts/slideLayout1.xml><?xml version="1.0" encoding="utf-8"?>
 <p:sldLayout xmlns:a="http://schemas.openxmlformats.org/drawingml/2006/main" xmlns:r="http://schemas.openxmlformats.org/officeDocument/2006/relationships" xmlns:p="http://schemas.openxmlformats.org/presentationml/2006/main" showMasterSp="0" type="title">
   <p:cSld name="TITLE">
@@ -1712,6 +1817,115 @@
 </p:sldLayout>
 </file>
 
+<file path=ppt/slideLayouts/slideLayout14.xml><?xml version="1.0" encoding="utf-8"?>
+<p:sldLayout xmlns:a="http://schemas.openxmlformats.org/drawingml/2006/main" xmlns:r="http://schemas.openxmlformats.org/officeDocument/2006/relationships" xmlns:p="http://schemas.openxmlformats.org/presentationml/2006/main" matchingName="Blank" type="blank">
+  <p:cSld name="1_Blank">
+    <p:spTree>
+      <p:nvGrpSpPr>
+        <p:cNvPr id="1" name="Shape 80"/>
+        <p:cNvGrpSpPr/>
+        <p:nvPr/>
+      </p:nvGrpSpPr>
+      <p:grpSpPr>
+        <a:xfrm>
+          <a:off x="0" y="0"/>
+          <a:ext cx="0" cy="0"/>
+          <a:chOff x="0" y="0"/>
+          <a:chExt cx="0" cy="0"/>
+        </a:xfrm>
+      </p:grpSpPr>
+      <p:sp>
+        <p:nvSpPr>
+          <p:cNvPr id="81" name="Google Shape;81;p12"/>
+          <p:cNvSpPr txBox="1">
+            <a:spLocks noGrp="1"/>
+          </p:cNvSpPr>
+          <p:nvPr>
+            <p:ph type="sldNum" idx="12"/>
+          </p:nvPr>
+        </p:nvSpPr>
+        <p:spPr>
+          <a:xfrm>
+            <a:off x="8536302" y="4749851"/>
+            <a:ext cx="548700" cy="393600"/>
+          </a:xfrm>
+          <a:prstGeom prst="rect">
+            <a:avLst/>
+          </a:prstGeom>
+        </p:spPr>
+        <p:txBody>
+          <a:bodyPr spcFirstLastPara="1" wrap="square" lIns="91425" tIns="91425" rIns="91425" bIns="91425" anchor="ctr" anchorCtr="0">
+            <a:normAutofit/>
+          </a:bodyPr>
+          <a:lstStyle>
+            <a:lvl1pPr lvl="0">
+              <a:buNone/>
+              <a:defRPr/>
+            </a:lvl1pPr>
+            <a:lvl2pPr lvl="1">
+              <a:buNone/>
+              <a:defRPr/>
+            </a:lvl2pPr>
+            <a:lvl3pPr lvl="2">
+              <a:buNone/>
+              <a:defRPr/>
+            </a:lvl3pPr>
+            <a:lvl4pPr lvl="3">
+              <a:buNone/>
+              <a:defRPr/>
+            </a:lvl4pPr>
+            <a:lvl5pPr lvl="4">
+              <a:buNone/>
+              <a:defRPr/>
+            </a:lvl5pPr>
+            <a:lvl6pPr lvl="5">
+              <a:buNone/>
+              <a:defRPr/>
+            </a:lvl6pPr>
+            <a:lvl7pPr lvl="6">
+              <a:buNone/>
+              <a:defRPr/>
+            </a:lvl7pPr>
+            <a:lvl8pPr lvl="7">
+              <a:buNone/>
+              <a:defRPr/>
+            </a:lvl8pPr>
+            <a:lvl9pPr lvl="8">
+              <a:buNone/>
+              <a:defRPr/>
+            </a:lvl9pPr>
+          </a:lstStyle>
+          <a:p>
+            <a:pPr marL="0" lvl="0" indent="0" algn="r" rtl="0">
+              <a:spcBef>
+                <a:spcPts val="0"/>
+              </a:spcBef>
+              <a:spcAft>
+                <a:spcPts val="0"/>
+              </a:spcAft>
+              <a:buNone/>
+            </a:pPr>
+            <a:fld id="{00000000-1234-1234-1234-123412341234}" type="slidenum">
+              <a:rPr lang="es-419"/>
+              <a:t>‹#›</a:t>
+            </a:fld>
+            <a:endParaRPr/>
+          </a:p>
+        </p:txBody>
+      </p:sp>
+    </p:spTree>
+    <p:extLst>
+      <p:ext uri="{BB962C8B-B14F-4D97-AF65-F5344CB8AC3E}">
+        <p14:creationId xmlns:p14="http://schemas.microsoft.com/office/powerpoint/2010/main" val="2085732569"/>
+      </p:ext>
+    </p:extLst>
+  </p:cSld>
+  <p:clrMapOvr>
+    <a:masterClrMapping/>
+  </p:clrMapOvr>
+</p:sldLayout>
+</file>
+
 <file path=ppt/slideLayouts/slideLayout2.xml><?xml version="1.0" encoding="utf-8"?>
 <p:sldLayout xmlns:a="http://schemas.openxmlformats.org/drawingml/2006/main" xmlns:r="http://schemas.openxmlformats.org/officeDocument/2006/relationships" xmlns:p="http://schemas.openxmlformats.org/presentationml/2006/main" showMasterSp="0" type="tx">
   <p:cSld name="SECTION_HEADER">
@@ -3422,7 +3636,7 @@
           </a:ln>
           <a:extLst>
             <a:ext uri="{C572A759-6A51-4108-AA02-DFA0A04FC94B}">
-              <ma14:wrappingTextBoxFlag xmlns:ma14="http://schemas.microsoft.com/office/mac/drawingml/2011/main" xmlns:a14="http://schemas.microsoft.com/office/drawing/2010/main" xmlns:m="http://schemas.openxmlformats.org/officeDocument/2006/math" xmlns="" val="1"/>
+              <ma14:wrappingTextBoxFlag xmlns="" xmlns:m="http://schemas.openxmlformats.org/officeDocument/2006/math" xmlns:a14="http://schemas.microsoft.com/office/drawing/2010/main" xmlns:ma14="http://schemas.microsoft.com/office/mac/drawingml/2011/main" val="1"/>
             </a:ext>
           </a:extLst>
         </p:spPr>
@@ -3461,7 +3675,7 @@
           </a:ln>
           <a:extLst>
             <a:ext uri="{C572A759-6A51-4108-AA02-DFA0A04FC94B}">
-              <ma14:wrappingTextBoxFlag xmlns:ma14="http://schemas.microsoft.com/office/mac/drawingml/2011/main" xmlns:a14="http://schemas.microsoft.com/office/drawing/2010/main" xmlns:m="http://schemas.openxmlformats.org/officeDocument/2006/math" xmlns="" val="1"/>
+              <ma14:wrappingTextBoxFlag xmlns="" xmlns:m="http://schemas.openxmlformats.org/officeDocument/2006/math" xmlns:a14="http://schemas.microsoft.com/office/drawing/2010/main" xmlns:ma14="http://schemas.microsoft.com/office/mac/drawingml/2011/main" val="1"/>
             </a:ext>
           </a:extLst>
         </p:spPr>
@@ -3565,6 +3779,7 @@
     <p:sldLayoutId id="2147483657" r:id="rId11"/>
     <p:sldLayoutId id="2147483658" r:id="rId12"/>
     <p:sldLayoutId id="2147483659" r:id="rId13"/>
+    <p:sldLayoutId id="2147483662" r:id="rId14"/>
   </p:sldLayoutIdLst>
   <p:transition spd="med"/>
   <p:txStyles>
@@ -4504,7 +4719,7 @@
           </a:ln>
           <a:extLst>
             <a:ext uri="{C572A759-6A51-4108-AA02-DFA0A04FC94B}">
-              <ma14:wrappingTextBoxFlag xmlns:ma14="http://schemas.microsoft.com/office/mac/drawingml/2011/main" xmlns:a14="http://schemas.microsoft.com/office/drawing/2010/main" xmlns:m="http://schemas.openxmlformats.org/officeDocument/2006/math" xmlns="" val="1"/>
+              <ma14:wrappingTextBoxFlag xmlns="" xmlns:m="http://schemas.openxmlformats.org/officeDocument/2006/math" xmlns:a14="http://schemas.microsoft.com/office/drawing/2010/main" xmlns:ma14="http://schemas.microsoft.com/office/mac/drawingml/2011/main" val="1"/>
             </a:ext>
           </a:extLst>
         </p:spPr>
@@ -4561,7 +4776,7 @@
           </a:ln>
           <a:extLst>
             <a:ext uri="{C572A759-6A51-4108-AA02-DFA0A04FC94B}">
-              <ma14:wrappingTextBoxFlag xmlns:ma14="http://schemas.microsoft.com/office/mac/drawingml/2011/main" xmlns:a14="http://schemas.microsoft.com/office/drawing/2010/main" xmlns:m="http://schemas.openxmlformats.org/officeDocument/2006/math" xmlns="" val="1"/>
+              <ma14:wrappingTextBoxFlag xmlns="" xmlns:m="http://schemas.openxmlformats.org/officeDocument/2006/math" xmlns:a14="http://schemas.microsoft.com/office/drawing/2010/main" xmlns:ma14="http://schemas.microsoft.com/office/mac/drawingml/2011/main" val="1"/>
             </a:ext>
           </a:extLst>
         </p:spPr>
@@ -4682,7 +4897,7 @@
             <a:effectLst/>
             <a:extLst>
               <a:ext uri="{C572A759-6A51-4108-AA02-DFA0A04FC94B}">
-                <ma14:wrappingTextBoxFlag xmlns:ma14="http://schemas.microsoft.com/office/mac/drawingml/2011/main" xmlns:a14="http://schemas.microsoft.com/office/drawing/2010/main" xmlns:m="http://schemas.openxmlformats.org/officeDocument/2006/math" xmlns="" val="1"/>
+                <ma14:wrappingTextBoxFlag xmlns="" xmlns:m="http://schemas.openxmlformats.org/officeDocument/2006/math" xmlns:a14="http://schemas.microsoft.com/office/drawing/2010/main" xmlns:ma14="http://schemas.microsoft.com/office/mac/drawingml/2011/main" val="1"/>
               </a:ext>
             </a:extLst>
           </p:spPr>
@@ -4711,6 +4926,40 @@
           </p:txBody>
         </p:sp>
       </p:grpSp>
+    </p:spTree>
+  </p:cSld>
+  <p:clrMapOvr>
+    <a:masterClrMapping/>
+  </p:clrMapOvr>
+  <p:transition spd="med"/>
+</p:sld>
+</file>
+
+<file path=ppt/slides/slide4.xml><?xml version="1.0" encoding="utf-8"?>
+<p:sld xmlns:a="http://schemas.openxmlformats.org/drawingml/2006/main" xmlns:r="http://schemas.openxmlformats.org/officeDocument/2006/relationships" xmlns:p="http://schemas.openxmlformats.org/presentationml/2006/main">
+  <p:cSld>
+    <p:bg>
+      <p:bgPr>
+        <a:solidFill>
+          <a:srgbClr val="E9EDEE"/>
+        </a:solidFill>
+        <a:effectLst/>
+      </p:bgPr>
+    </p:bg>
+    <p:spTree>
+      <p:nvGrpSpPr>
+        <p:cNvPr id="1" name="Shape 373"/>
+        <p:cNvGrpSpPr/>
+        <p:nvPr/>
+      </p:nvGrpSpPr>
+      <p:grpSpPr>
+        <a:xfrm>
+          <a:off x="0" y="0"/>
+          <a:ext cx="0" cy="0"/>
+          <a:chOff x="0" y="0"/>
+          <a:chExt cx="0" cy="0"/>
+        </a:xfrm>
+      </p:grpSpPr>
     </p:spTree>
   </p:cSld>
   <p:clrMapOvr>

</xml_diff>